<commit_message>
commit git basic study guide
</commit_message>
<xml_diff>
--- a/gitBasic.pptx
+++ b/gitBasic.pptx
@@ -398,7 +398,7 @@
     </p:spTree>
     <p:extLst>
       <p:ext uri="{BB962C8B-B14F-4D97-AF65-F5344CB8AC3E}">
-        <p14:creationId xmlns:p14="http://schemas.microsoft.com/office/powerpoint/2010/main" val="1928438154"/>
+        <p14:creationId xmlns:p14="http://schemas.microsoft.com/office/powerpoint/2010/main" val="1035720466"/>
       </p:ext>
     </p:extLst>
   </p:cSld>
@@ -676,7 +676,7 @@
     </p:spTree>
     <p:extLst>
       <p:ext uri="{BB962C8B-B14F-4D97-AF65-F5344CB8AC3E}">
-        <p14:creationId xmlns:p14="http://schemas.microsoft.com/office/powerpoint/2010/main" val="592022168"/>
+        <p14:creationId xmlns:p14="http://schemas.microsoft.com/office/powerpoint/2010/main" val="1875547903"/>
       </p:ext>
     </p:extLst>
   </p:cSld>
@@ -908,7 +908,7 @@
     </p:spTree>
     <p:extLst>
       <p:ext uri="{BB962C8B-B14F-4D97-AF65-F5344CB8AC3E}">
-        <p14:creationId xmlns:p14="http://schemas.microsoft.com/office/powerpoint/2010/main" val="824841025"/>
+        <p14:creationId xmlns:p14="http://schemas.microsoft.com/office/powerpoint/2010/main" val="1568635055"/>
       </p:ext>
     </p:extLst>
   </p:cSld>
@@ -1020,7 +1020,7 @@
     </p:spTree>
     <p:extLst>
       <p:ext uri="{BB962C8B-B14F-4D97-AF65-F5344CB8AC3E}">
-        <p14:creationId xmlns:p14="http://schemas.microsoft.com/office/powerpoint/2010/main" val="1096165790"/>
+        <p14:creationId xmlns:p14="http://schemas.microsoft.com/office/powerpoint/2010/main" val="1540118813"/>
       </p:ext>
     </p:extLst>
   </p:cSld>
@@ -1132,7 +1132,7 @@
     </p:spTree>
     <p:extLst>
       <p:ext uri="{BB962C8B-B14F-4D97-AF65-F5344CB8AC3E}">
-        <p14:creationId xmlns:p14="http://schemas.microsoft.com/office/powerpoint/2010/main" val="2143708564"/>
+        <p14:creationId xmlns:p14="http://schemas.microsoft.com/office/powerpoint/2010/main" val="1156492800"/>
       </p:ext>
     </p:extLst>
   </p:cSld>
@@ -1224,7 +1224,7 @@
     </p:spTree>
     <p:extLst>
       <p:ext uri="{BB962C8B-B14F-4D97-AF65-F5344CB8AC3E}">
-        <p14:creationId xmlns:p14="http://schemas.microsoft.com/office/powerpoint/2010/main" val="2001719182"/>
+        <p14:creationId xmlns:p14="http://schemas.microsoft.com/office/powerpoint/2010/main" val="1966015112"/>
       </p:ext>
     </p:extLst>
   </p:cSld>
@@ -1336,7 +1336,7 @@
     </p:spTree>
     <p:extLst>
       <p:ext uri="{BB962C8B-B14F-4D97-AF65-F5344CB8AC3E}">
-        <p14:creationId xmlns:p14="http://schemas.microsoft.com/office/powerpoint/2010/main" val="415477972"/>
+        <p14:creationId xmlns:p14="http://schemas.microsoft.com/office/powerpoint/2010/main" val="1632594642"/>
       </p:ext>
     </p:extLst>
   </p:cSld>
@@ -1428,7 +1428,7 @@
     </p:spTree>
     <p:extLst>
       <p:ext uri="{BB962C8B-B14F-4D97-AF65-F5344CB8AC3E}">
-        <p14:creationId xmlns:p14="http://schemas.microsoft.com/office/powerpoint/2010/main" val="1468939007"/>
+        <p14:creationId xmlns:p14="http://schemas.microsoft.com/office/powerpoint/2010/main" val="619590375"/>
       </p:ext>
     </p:extLst>
   </p:cSld>
@@ -1540,7 +1540,7 @@
     </p:spTree>
     <p:extLst>
       <p:ext uri="{BB962C8B-B14F-4D97-AF65-F5344CB8AC3E}">
-        <p14:creationId xmlns:p14="http://schemas.microsoft.com/office/powerpoint/2010/main" val="985884737"/>
+        <p14:creationId xmlns:p14="http://schemas.microsoft.com/office/powerpoint/2010/main" val="307228322"/>
       </p:ext>
     </p:extLst>
   </p:cSld>
@@ -2349,6 +2349,184 @@
 </file>
 
 <file path=ppt/slideLayouts/slideLayout13.xml><?xml version="1.0" encoding="utf-8"?>
+<p:sldLayout xmlns:a="http://schemas.openxmlformats.org/drawingml/2006/main" xmlns:r="http://schemas.openxmlformats.org/officeDocument/2006/relationships" xmlns:p="http://schemas.openxmlformats.org/presentationml/2006/main" preserve="1" userDrawn="1">
+  <p:cSld name="1_Title and Vertical Text">
+    <p:spTree>
+      <p:nvGrpSpPr>
+        <p:cNvPr id="1" name=""/>
+        <p:cNvGrpSpPr/>
+        <p:nvPr/>
+      </p:nvGrpSpPr>
+      <p:grpSpPr>
+        <a:xfrm>
+          <a:off x="0" y="0"/>
+          <a:ext cx="0" cy="0"/>
+          <a:chOff x="0" y="0"/>
+          <a:chExt cx="0" cy="0"/>
+        </a:xfrm>
+      </p:grpSpPr>
+      <p:sp>
+        <p:nvSpPr>
+          <p:cNvPr id="3" name="Vertical Text Placeholder 2"/>
+          <p:cNvSpPr>
+            <a:spLocks noGrp="1"/>
+          </p:cNvSpPr>
+          <p:nvPr>
+            <p:ph type="body" orient="vert" idx="1"/>
+          </p:nvPr>
+        </p:nvSpPr>
+        <p:spPr/>
+        <p:txBody>
+          <a:bodyPr vert="eaVert" anchor="t"/>
+          <a:lstStyle/>
+          <a:p>
+            <a:pPr lvl="0"/>
+            <a:r>
+              <a:rPr lang="en-US" smtClean="0"/>
+              <a:t>Click to edit Master text styles</a:t>
+            </a:r>
+          </a:p>
+          <a:p>
+            <a:pPr lvl="1"/>
+            <a:r>
+              <a:rPr lang="en-US" smtClean="0"/>
+              <a:t>Second level</a:t>
+            </a:r>
+          </a:p>
+          <a:p>
+            <a:pPr lvl="2"/>
+            <a:r>
+              <a:rPr lang="en-US" smtClean="0"/>
+              <a:t>Third level</a:t>
+            </a:r>
+          </a:p>
+          <a:p>
+            <a:pPr lvl="3"/>
+            <a:r>
+              <a:rPr lang="en-US" smtClean="0"/>
+              <a:t>Fourth level</a:t>
+            </a:r>
+          </a:p>
+          <a:p>
+            <a:pPr lvl="4"/>
+            <a:r>
+              <a:rPr lang="en-US" smtClean="0"/>
+              <a:t>Fifth level</a:t>
+            </a:r>
+            <a:endParaRPr lang="en-US" dirty="0"/>
+          </a:p>
+        </p:txBody>
+      </p:sp>
+      <p:sp>
+        <p:nvSpPr>
+          <p:cNvPr id="4" name="Date Placeholder 3"/>
+          <p:cNvSpPr>
+            <a:spLocks noGrp="1"/>
+          </p:cNvSpPr>
+          <p:nvPr>
+            <p:ph type="dt" sz="half" idx="10"/>
+          </p:nvPr>
+        </p:nvSpPr>
+        <p:spPr/>
+        <p:txBody>
+          <a:bodyPr/>
+          <a:lstStyle/>
+          <a:p>
+            <a:pPr>
+              <a:defRPr/>
+            </a:pPr>
+            <a:endParaRPr lang="en-US" altLang="zh-TW"/>
+          </a:p>
+        </p:txBody>
+      </p:sp>
+      <p:sp>
+        <p:nvSpPr>
+          <p:cNvPr id="5" name="Footer Placeholder 4"/>
+          <p:cNvSpPr>
+            <a:spLocks noGrp="1"/>
+          </p:cNvSpPr>
+          <p:nvPr>
+            <p:ph type="ftr" sz="quarter" idx="11"/>
+          </p:nvPr>
+        </p:nvSpPr>
+        <p:spPr/>
+        <p:txBody>
+          <a:bodyPr/>
+          <a:lstStyle/>
+          <a:p>
+            <a:pPr>
+              <a:defRPr/>
+            </a:pPr>
+            <a:endParaRPr lang="en-US" altLang="zh-TW"/>
+          </a:p>
+        </p:txBody>
+      </p:sp>
+      <p:sp>
+        <p:nvSpPr>
+          <p:cNvPr id="6" name="Slide Number Placeholder 5"/>
+          <p:cNvSpPr>
+            <a:spLocks noGrp="1"/>
+          </p:cNvSpPr>
+          <p:nvPr>
+            <p:ph type="sldNum" sz="quarter" idx="12"/>
+          </p:nvPr>
+        </p:nvSpPr>
+        <p:spPr/>
+        <p:txBody>
+          <a:bodyPr/>
+          <a:lstStyle/>
+          <a:p>
+            <a:pPr>
+              <a:defRPr/>
+            </a:pPr>
+            <a:fld id="{0CEA4035-41F3-49BC-AFBA-2E77D65251A3}" type="slidenum">
+              <a:rPr lang="en-US" altLang="zh-TW" smtClean="0"/>
+              <a:pPr>
+                <a:defRPr/>
+              </a:pPr>
+              <a:t>‹#›</a:t>
+            </a:fld>
+            <a:endParaRPr lang="en-US" altLang="zh-TW"/>
+          </a:p>
+        </p:txBody>
+      </p:sp>
+      <p:sp>
+        <p:nvSpPr>
+          <p:cNvPr id="7" name="Title 6"/>
+          <p:cNvSpPr>
+            <a:spLocks noGrp="1"/>
+          </p:cNvSpPr>
+          <p:nvPr>
+            <p:ph type="title"/>
+          </p:nvPr>
+        </p:nvSpPr>
+        <p:spPr/>
+        <p:txBody>
+          <a:bodyPr/>
+          <a:lstStyle/>
+          <a:p>
+            <a:r>
+              <a:rPr lang="en-US" smtClean="0"/>
+              <a:t>Click to edit Master title style</a:t>
+            </a:r>
+            <a:endParaRPr lang="en-US"/>
+          </a:p>
+        </p:txBody>
+      </p:sp>
+    </p:spTree>
+    <p:extLst>
+      <p:ext uri="{BB962C8B-B14F-4D97-AF65-F5344CB8AC3E}">
+        <p14:creationId xmlns:p14="http://schemas.microsoft.com/office/powerpoint/2010/main" val="1677484127"/>
+      </p:ext>
+    </p:extLst>
+  </p:cSld>
+  <p:clrMapOvr>
+    <a:masterClrMapping/>
+  </p:clrMapOvr>
+</p:sldLayout>
+</file>
+
+<file path=ppt/slideLayouts/slideLayout14.xml><?xml version="1.0" encoding="utf-8"?>
 <p:sldLayout xmlns:a="http://schemas.openxmlformats.org/drawingml/2006/main" xmlns:r="http://schemas.openxmlformats.org/officeDocument/2006/relationships" xmlns:p="http://schemas.openxmlformats.org/presentationml/2006/main" type="title" preserve="1">
   <p:cSld name="標題投影片">
     <p:spTree>
@@ -2564,7 +2742,7 @@
 </p:sldLayout>
 </file>
 
-<file path=ppt/slideLayouts/slideLayout14.xml><?xml version="1.0" encoding="utf-8"?>
+<file path=ppt/slideLayouts/slideLayout15.xml><?xml version="1.0" encoding="utf-8"?>
 <p:sldLayout xmlns:a="http://schemas.openxmlformats.org/drawingml/2006/main" xmlns:r="http://schemas.openxmlformats.org/officeDocument/2006/relationships" xmlns:p="http://schemas.openxmlformats.org/presentationml/2006/main" type="obj" preserve="1">
   <p:cSld name="標題及物件">
     <p:spTree>
@@ -2762,7 +2940,7 @@
 </p:sldLayout>
 </file>
 
-<file path=ppt/slideLayouts/slideLayout15.xml><?xml version="1.0" encoding="utf-8"?>
+<file path=ppt/slideLayouts/slideLayout16.xml><?xml version="1.0" encoding="utf-8"?>
 <p:sldLayout xmlns:a="http://schemas.openxmlformats.org/drawingml/2006/main" xmlns:r="http://schemas.openxmlformats.org/officeDocument/2006/relationships" xmlns:p="http://schemas.openxmlformats.org/presentationml/2006/main" type="secHead" preserve="1">
   <p:cSld name="區段標題">
     <p:spTree>
@@ -2982,7 +3160,7 @@
 </p:sldLayout>
 </file>
 
-<file path=ppt/slideLayouts/slideLayout16.xml><?xml version="1.0" encoding="utf-8"?>
+<file path=ppt/slideLayouts/slideLayout17.xml><?xml version="1.0" encoding="utf-8"?>
 <p:sldLayout xmlns:a="http://schemas.openxmlformats.org/drawingml/2006/main" xmlns:r="http://schemas.openxmlformats.org/officeDocument/2006/relationships" xmlns:p="http://schemas.openxmlformats.org/presentationml/2006/main" type="twoObj" preserve="1">
   <p:cSld name="兩項物件">
     <p:spTree>
@@ -3298,7 +3476,7 @@
 </p:sldLayout>
 </file>
 
-<file path=ppt/slideLayouts/slideLayout17.xml><?xml version="1.0" encoding="utf-8"?>
+<file path=ppt/slideLayouts/slideLayout18.xml><?xml version="1.0" encoding="utf-8"?>
 <p:sldLayout xmlns:a="http://schemas.openxmlformats.org/drawingml/2006/main" xmlns:r="http://schemas.openxmlformats.org/officeDocument/2006/relationships" xmlns:p="http://schemas.openxmlformats.org/presentationml/2006/main" type="twoTxTwoObj" preserve="1">
   <p:cSld name="比對">
     <p:spTree>
@@ -3753,7 +3931,7 @@
 </p:sldLayout>
 </file>
 
-<file path=ppt/slideLayouts/slideLayout18.xml><?xml version="1.0" encoding="utf-8"?>
+<file path=ppt/slideLayouts/slideLayout19.xml><?xml version="1.0" encoding="utf-8"?>
 <p:sldLayout xmlns:a="http://schemas.openxmlformats.org/drawingml/2006/main" xmlns:r="http://schemas.openxmlformats.org/officeDocument/2006/relationships" xmlns:p="http://schemas.openxmlformats.org/presentationml/2006/main" type="titleOnly" preserve="1">
   <p:cSld name="只有標題">
     <p:spTree>
@@ -3881,129 +4059,6 @@
               <a:defRPr/>
             </a:pPr>
             <a:fld id="{F63BC2B5-20C4-46EC-B0AB-7CE8CDE8E7B2}" type="slidenum">
-              <a:rPr lang="zh-TW" altLang="en-US"/>
-              <a:pPr>
-                <a:defRPr/>
-              </a:pPr>
-              <a:t>‹#›</a:t>
-            </a:fld>
-            <a:endParaRPr lang="en-US" altLang="zh-TW"/>
-          </a:p>
-        </p:txBody>
-      </p:sp>
-    </p:spTree>
-  </p:cSld>
-  <p:clrMapOvr>
-    <a:masterClrMapping/>
-  </p:clrMapOvr>
-</p:sldLayout>
-</file>
-
-<file path=ppt/slideLayouts/slideLayout19.xml><?xml version="1.0" encoding="utf-8"?>
-<p:sldLayout xmlns:a="http://schemas.openxmlformats.org/drawingml/2006/main" xmlns:r="http://schemas.openxmlformats.org/officeDocument/2006/relationships" xmlns:p="http://schemas.openxmlformats.org/presentationml/2006/main" type="blank" preserve="1">
-  <p:cSld name="空白">
-    <p:spTree>
-      <p:nvGrpSpPr>
-        <p:cNvPr id="1" name=""/>
-        <p:cNvGrpSpPr/>
-        <p:nvPr/>
-      </p:nvGrpSpPr>
-      <p:grpSpPr>
-        <a:xfrm>
-          <a:off x="0" y="0"/>
-          <a:ext cx="0" cy="0"/>
-          <a:chOff x="0" y="0"/>
-          <a:chExt cx="0" cy="0"/>
-        </a:xfrm>
-      </p:grpSpPr>
-      <p:sp>
-        <p:nvSpPr>
-          <p:cNvPr id="2" name="Rectangle 4"/>
-          <p:cNvSpPr>
-            <a:spLocks noGrp="1" noChangeArrowheads="1"/>
-          </p:cNvSpPr>
-          <p:nvPr>
-            <p:ph type="dt" sz="half" idx="10"/>
-          </p:nvPr>
-        </p:nvSpPr>
-        <p:spPr>
-          <a:ln/>
-        </p:spPr>
-        <p:txBody>
-          <a:bodyPr/>
-          <a:lstStyle>
-            <a:lvl1pPr>
-              <a:defRPr/>
-            </a:lvl1pPr>
-          </a:lstStyle>
-          <a:p>
-            <a:pPr>
-              <a:defRPr/>
-            </a:pPr>
-            <a:fld id="{F529E783-8B38-4291-B30B-1C7816F95982}" type="datetimeFigureOut">
-              <a:rPr lang="zh-TW" altLang="en-US"/>
-              <a:pPr>
-                <a:defRPr/>
-              </a:pPr>
-              <a:t>2017/3/13</a:t>
-            </a:fld>
-            <a:endParaRPr lang="en-US" altLang="zh-TW"/>
-          </a:p>
-        </p:txBody>
-      </p:sp>
-      <p:sp>
-        <p:nvSpPr>
-          <p:cNvPr id="3" name="Rectangle 5"/>
-          <p:cNvSpPr>
-            <a:spLocks noGrp="1" noChangeArrowheads="1"/>
-          </p:cNvSpPr>
-          <p:nvPr>
-            <p:ph type="ftr" sz="quarter" idx="11"/>
-          </p:nvPr>
-        </p:nvSpPr>
-        <p:spPr>
-          <a:ln/>
-        </p:spPr>
-        <p:txBody>
-          <a:bodyPr/>
-          <a:lstStyle>
-            <a:lvl1pPr>
-              <a:defRPr/>
-            </a:lvl1pPr>
-          </a:lstStyle>
-          <a:p>
-            <a:pPr>
-              <a:defRPr/>
-            </a:pPr>
-            <a:endParaRPr lang="en-US" altLang="zh-TW"/>
-          </a:p>
-        </p:txBody>
-      </p:sp>
-      <p:sp>
-        <p:nvSpPr>
-          <p:cNvPr id="4" name="Rectangle 6"/>
-          <p:cNvSpPr>
-            <a:spLocks noGrp="1" noChangeArrowheads="1"/>
-          </p:cNvSpPr>
-          <p:nvPr>
-            <p:ph type="sldNum" sz="quarter" idx="12"/>
-          </p:nvPr>
-        </p:nvSpPr>
-        <p:spPr>
-          <a:ln/>
-        </p:spPr>
-        <p:txBody>
-          <a:bodyPr/>
-          <a:lstStyle>
-            <a:lvl1pPr>
-              <a:defRPr/>
-            </a:lvl1pPr>
-          </a:lstStyle>
-          <a:p>
-            <a:pPr>
-              <a:defRPr/>
-            </a:pPr>
-            <a:fld id="{B46034D4-54C8-4262-94AD-EB578B716E68}" type="slidenum">
               <a:rPr lang="zh-TW" altLang="en-US"/>
               <a:pPr>
                 <a:defRPr/>
@@ -4215,6 +4270,129 @@
 </file>
 
 <file path=ppt/slideLayouts/slideLayout20.xml><?xml version="1.0" encoding="utf-8"?>
+<p:sldLayout xmlns:a="http://schemas.openxmlformats.org/drawingml/2006/main" xmlns:r="http://schemas.openxmlformats.org/officeDocument/2006/relationships" xmlns:p="http://schemas.openxmlformats.org/presentationml/2006/main" type="blank" preserve="1">
+  <p:cSld name="空白">
+    <p:spTree>
+      <p:nvGrpSpPr>
+        <p:cNvPr id="1" name=""/>
+        <p:cNvGrpSpPr/>
+        <p:nvPr/>
+      </p:nvGrpSpPr>
+      <p:grpSpPr>
+        <a:xfrm>
+          <a:off x="0" y="0"/>
+          <a:ext cx="0" cy="0"/>
+          <a:chOff x="0" y="0"/>
+          <a:chExt cx="0" cy="0"/>
+        </a:xfrm>
+      </p:grpSpPr>
+      <p:sp>
+        <p:nvSpPr>
+          <p:cNvPr id="2" name="Rectangle 4"/>
+          <p:cNvSpPr>
+            <a:spLocks noGrp="1" noChangeArrowheads="1"/>
+          </p:cNvSpPr>
+          <p:nvPr>
+            <p:ph type="dt" sz="half" idx="10"/>
+          </p:nvPr>
+        </p:nvSpPr>
+        <p:spPr>
+          <a:ln/>
+        </p:spPr>
+        <p:txBody>
+          <a:bodyPr/>
+          <a:lstStyle>
+            <a:lvl1pPr>
+              <a:defRPr/>
+            </a:lvl1pPr>
+          </a:lstStyle>
+          <a:p>
+            <a:pPr>
+              <a:defRPr/>
+            </a:pPr>
+            <a:fld id="{F529E783-8B38-4291-B30B-1C7816F95982}" type="datetimeFigureOut">
+              <a:rPr lang="zh-TW" altLang="en-US"/>
+              <a:pPr>
+                <a:defRPr/>
+              </a:pPr>
+              <a:t>2017/3/13</a:t>
+            </a:fld>
+            <a:endParaRPr lang="en-US" altLang="zh-TW"/>
+          </a:p>
+        </p:txBody>
+      </p:sp>
+      <p:sp>
+        <p:nvSpPr>
+          <p:cNvPr id="3" name="Rectangle 5"/>
+          <p:cNvSpPr>
+            <a:spLocks noGrp="1" noChangeArrowheads="1"/>
+          </p:cNvSpPr>
+          <p:nvPr>
+            <p:ph type="ftr" sz="quarter" idx="11"/>
+          </p:nvPr>
+        </p:nvSpPr>
+        <p:spPr>
+          <a:ln/>
+        </p:spPr>
+        <p:txBody>
+          <a:bodyPr/>
+          <a:lstStyle>
+            <a:lvl1pPr>
+              <a:defRPr/>
+            </a:lvl1pPr>
+          </a:lstStyle>
+          <a:p>
+            <a:pPr>
+              <a:defRPr/>
+            </a:pPr>
+            <a:endParaRPr lang="en-US" altLang="zh-TW"/>
+          </a:p>
+        </p:txBody>
+      </p:sp>
+      <p:sp>
+        <p:nvSpPr>
+          <p:cNvPr id="4" name="Rectangle 6"/>
+          <p:cNvSpPr>
+            <a:spLocks noGrp="1" noChangeArrowheads="1"/>
+          </p:cNvSpPr>
+          <p:nvPr>
+            <p:ph type="sldNum" sz="quarter" idx="12"/>
+          </p:nvPr>
+        </p:nvSpPr>
+        <p:spPr>
+          <a:ln/>
+        </p:spPr>
+        <p:txBody>
+          <a:bodyPr/>
+          <a:lstStyle>
+            <a:lvl1pPr>
+              <a:defRPr/>
+            </a:lvl1pPr>
+          </a:lstStyle>
+          <a:p>
+            <a:pPr>
+              <a:defRPr/>
+            </a:pPr>
+            <a:fld id="{B46034D4-54C8-4262-94AD-EB578B716E68}" type="slidenum">
+              <a:rPr lang="zh-TW" altLang="en-US"/>
+              <a:pPr>
+                <a:defRPr/>
+              </a:pPr>
+              <a:t>‹#›</a:t>
+            </a:fld>
+            <a:endParaRPr lang="en-US" altLang="zh-TW"/>
+          </a:p>
+        </p:txBody>
+      </p:sp>
+    </p:spTree>
+  </p:cSld>
+  <p:clrMapOvr>
+    <a:masterClrMapping/>
+  </p:clrMapOvr>
+</p:sldLayout>
+</file>
+
+<file path=ppt/slideLayouts/slideLayout21.xml><?xml version="1.0" encoding="utf-8"?>
 <p:sldLayout xmlns:a="http://schemas.openxmlformats.org/drawingml/2006/main" xmlns:r="http://schemas.openxmlformats.org/officeDocument/2006/relationships" xmlns:p="http://schemas.openxmlformats.org/presentationml/2006/main" type="objTx" preserve="1">
   <p:cSld name="含標題的內容">
     <p:spTree>
@@ -4519,7 +4697,7 @@
 </p:sldLayout>
 </file>
 
-<file path=ppt/slideLayouts/slideLayout21.xml><?xml version="1.0" encoding="utf-8"?>
+<file path=ppt/slideLayouts/slideLayout22.xml><?xml version="1.0" encoding="utf-8"?>
 <p:sldLayout xmlns:a="http://schemas.openxmlformats.org/drawingml/2006/main" xmlns:r="http://schemas.openxmlformats.org/officeDocument/2006/relationships" xmlns:p="http://schemas.openxmlformats.org/presentationml/2006/main" type="picTx" preserve="1">
   <p:cSld name="含標題的圖片">
     <p:spTree>
@@ -4801,7 +4979,7 @@
 </p:sldLayout>
 </file>
 
-<file path=ppt/slideLayouts/slideLayout22.xml><?xml version="1.0" encoding="utf-8"?>
+<file path=ppt/slideLayouts/slideLayout23.xml><?xml version="1.0" encoding="utf-8"?>
 <p:sldLayout xmlns:a="http://schemas.openxmlformats.org/drawingml/2006/main" xmlns:r="http://schemas.openxmlformats.org/officeDocument/2006/relationships" xmlns:p="http://schemas.openxmlformats.org/presentationml/2006/main" type="vertTx" preserve="1">
   <p:cSld name="標題及直排文字">
     <p:spTree>
@@ -4999,7 +5177,7 @@
 </p:sldLayout>
 </file>
 
-<file path=ppt/slideLayouts/slideLayout23.xml><?xml version="1.0" encoding="utf-8"?>
+<file path=ppt/slideLayouts/slideLayout24.xml><?xml version="1.0" encoding="utf-8"?>
 <p:sldLayout xmlns:a="http://schemas.openxmlformats.org/drawingml/2006/main" xmlns:r="http://schemas.openxmlformats.org/officeDocument/2006/relationships" xmlns:p="http://schemas.openxmlformats.org/presentationml/2006/main" type="vertTitleAndTx" preserve="1">
   <p:cSld name="直排標題及文字">
     <p:spTree>
@@ -5207,7 +5385,7 @@
 </p:sldLayout>
 </file>
 
-<file path=ppt/slideLayouts/slideLayout24.xml><?xml version="1.0" encoding="utf-8"?>
+<file path=ppt/slideLayouts/slideLayout25.xml><?xml version="1.0" encoding="utf-8"?>
 <p:sldLayout xmlns:a="http://schemas.openxmlformats.org/drawingml/2006/main" xmlns:r="http://schemas.openxmlformats.org/officeDocument/2006/relationships" xmlns:p="http://schemas.openxmlformats.org/presentationml/2006/main" preserve="1" userDrawn="1">
   <p:cSld name="自訂版面配置">
     <p:spTree>
@@ -5353,7 +5531,7 @@
 </p:sldLayout>
 </file>
 
-<file path=ppt/slideLayouts/slideLayout25.xml><?xml version="1.0" encoding="utf-8"?>
+<file path=ppt/slideLayouts/slideLayout26.xml><?xml version="1.0" encoding="utf-8"?>
 <p:sldLayout xmlns:a="http://schemas.openxmlformats.org/drawingml/2006/main" xmlns:r="http://schemas.openxmlformats.org/officeDocument/2006/relationships" xmlns:p="http://schemas.openxmlformats.org/presentationml/2006/main" type="title" preserve="1">
   <p:cSld name="標題投影片">
     <p:spTree>
@@ -5617,7 +5795,7 @@
 </p:sldLayout>
 </file>
 
-<file path=ppt/slideLayouts/slideLayout26.xml><?xml version="1.0" encoding="utf-8"?>
+<file path=ppt/slideLayouts/slideLayout27.xml><?xml version="1.0" encoding="utf-8"?>
 <p:sldLayout xmlns:a="http://schemas.openxmlformats.org/drawingml/2006/main" xmlns:r="http://schemas.openxmlformats.org/officeDocument/2006/relationships" xmlns:p="http://schemas.openxmlformats.org/presentationml/2006/main" type="obj" preserve="1">
   <p:cSld name="標題及物件">
     <p:spTree>
@@ -5809,7 +5987,7 @@
 </p:sldLayout>
 </file>
 
-<file path=ppt/slideLayouts/slideLayout27.xml><?xml version="1.0" encoding="utf-8"?>
+<file path=ppt/slideLayouts/slideLayout28.xml><?xml version="1.0" encoding="utf-8"?>
 <p:sldLayout xmlns:a="http://schemas.openxmlformats.org/drawingml/2006/main" xmlns:r="http://schemas.openxmlformats.org/officeDocument/2006/relationships" xmlns:p="http://schemas.openxmlformats.org/presentationml/2006/main" type="secHead" preserve="1">
   <p:cSld name="區段標題">
     <p:spTree>
@@ -6077,7 +6255,7 @@
 </p:sldLayout>
 </file>
 
-<file path=ppt/slideLayouts/slideLayout28.xml><?xml version="1.0" encoding="utf-8"?>
+<file path=ppt/slideLayouts/slideLayout29.xml><?xml version="1.0" encoding="utf-8"?>
 <p:sldLayout xmlns:a="http://schemas.openxmlformats.org/drawingml/2006/main" xmlns:r="http://schemas.openxmlformats.org/officeDocument/2006/relationships" xmlns:p="http://schemas.openxmlformats.org/presentationml/2006/main" type="twoObj" preserve="1">
   <p:cSld name="兩項物件">
     <p:spTree>
@@ -6387,7 +6565,275 @@
 </p:sldLayout>
 </file>
 
-<file path=ppt/slideLayouts/slideLayout29.xml><?xml version="1.0" encoding="utf-8"?>
+<file path=ppt/slideLayouts/slideLayout3.xml><?xml version="1.0" encoding="utf-8"?>
+<p:sldLayout xmlns:a="http://schemas.openxmlformats.org/drawingml/2006/main" xmlns:r="http://schemas.openxmlformats.org/officeDocument/2006/relationships" xmlns:p="http://schemas.openxmlformats.org/presentationml/2006/main" type="secHead" preserve="1">
+  <p:cSld name="區段標題">
+    <p:spTree>
+      <p:nvGrpSpPr>
+        <p:cNvPr id="1" name=""/>
+        <p:cNvGrpSpPr/>
+        <p:nvPr/>
+      </p:nvGrpSpPr>
+      <p:grpSpPr>
+        <a:xfrm>
+          <a:off x="0" y="0"/>
+          <a:ext cx="0" cy="0"/>
+          <a:chOff x="0" y="0"/>
+          <a:chExt cx="0" cy="0"/>
+        </a:xfrm>
+      </p:grpSpPr>
+      <p:sp>
+        <p:nvSpPr>
+          <p:cNvPr id="2" name="標題 1"/>
+          <p:cNvSpPr>
+            <a:spLocks noGrp="1"/>
+          </p:cNvSpPr>
+          <p:nvPr>
+            <p:ph type="title"/>
+          </p:nvPr>
+        </p:nvSpPr>
+        <p:spPr>
+          <a:xfrm>
+            <a:off x="722313" y="4406900"/>
+            <a:ext cx="7772400" cy="1362075"/>
+          </a:xfrm>
+        </p:spPr>
+        <p:txBody>
+          <a:bodyPr anchor="t"/>
+          <a:lstStyle>
+            <a:lvl1pPr algn="l">
+              <a:defRPr sz="4000" b="1" cap="all"/>
+            </a:lvl1pPr>
+          </a:lstStyle>
+          <a:p>
+            <a:r>
+              <a:rPr lang="zh-TW" altLang="en-US" smtClean="0"/>
+              <a:t>按一下以編輯母片標題樣式</a:t>
+            </a:r>
+            <a:endParaRPr lang="zh-TW" altLang="en-US"/>
+          </a:p>
+        </p:txBody>
+      </p:sp>
+      <p:sp>
+        <p:nvSpPr>
+          <p:cNvPr id="3" name="文字版面配置區 2"/>
+          <p:cNvSpPr>
+            <a:spLocks noGrp="1"/>
+          </p:cNvSpPr>
+          <p:nvPr>
+            <p:ph type="body" idx="1"/>
+          </p:nvPr>
+        </p:nvSpPr>
+        <p:spPr>
+          <a:xfrm>
+            <a:off x="722313" y="2906713"/>
+            <a:ext cx="7772400" cy="1500187"/>
+          </a:xfrm>
+        </p:spPr>
+        <p:txBody>
+          <a:bodyPr anchor="b"/>
+          <a:lstStyle>
+            <a:lvl1pPr marL="0" indent="0">
+              <a:buNone/>
+              <a:defRPr sz="2000">
+                <a:solidFill>
+                  <a:schemeClr val="tx1">
+                    <a:tint val="75000"/>
+                  </a:schemeClr>
+                </a:solidFill>
+              </a:defRPr>
+            </a:lvl1pPr>
+            <a:lvl2pPr marL="457200" indent="0">
+              <a:buNone/>
+              <a:defRPr sz="1800">
+                <a:solidFill>
+                  <a:schemeClr val="tx1">
+                    <a:tint val="75000"/>
+                  </a:schemeClr>
+                </a:solidFill>
+              </a:defRPr>
+            </a:lvl2pPr>
+            <a:lvl3pPr marL="914400" indent="0">
+              <a:buNone/>
+              <a:defRPr sz="1600">
+                <a:solidFill>
+                  <a:schemeClr val="tx1">
+                    <a:tint val="75000"/>
+                  </a:schemeClr>
+                </a:solidFill>
+              </a:defRPr>
+            </a:lvl3pPr>
+            <a:lvl4pPr marL="1371600" indent="0">
+              <a:buNone/>
+              <a:defRPr sz="1400">
+                <a:solidFill>
+                  <a:schemeClr val="tx1">
+                    <a:tint val="75000"/>
+                  </a:schemeClr>
+                </a:solidFill>
+              </a:defRPr>
+            </a:lvl4pPr>
+            <a:lvl5pPr marL="1828800" indent="0">
+              <a:buNone/>
+              <a:defRPr sz="1400">
+                <a:solidFill>
+                  <a:schemeClr val="tx1">
+                    <a:tint val="75000"/>
+                  </a:schemeClr>
+                </a:solidFill>
+              </a:defRPr>
+            </a:lvl5pPr>
+            <a:lvl6pPr marL="2286000" indent="0">
+              <a:buNone/>
+              <a:defRPr sz="1400">
+                <a:solidFill>
+                  <a:schemeClr val="tx1">
+                    <a:tint val="75000"/>
+                  </a:schemeClr>
+                </a:solidFill>
+              </a:defRPr>
+            </a:lvl6pPr>
+            <a:lvl7pPr marL="2743200" indent="0">
+              <a:buNone/>
+              <a:defRPr sz="1400">
+                <a:solidFill>
+                  <a:schemeClr val="tx1">
+                    <a:tint val="75000"/>
+                  </a:schemeClr>
+                </a:solidFill>
+              </a:defRPr>
+            </a:lvl7pPr>
+            <a:lvl8pPr marL="3200400" indent="0">
+              <a:buNone/>
+              <a:defRPr sz="1400">
+                <a:solidFill>
+                  <a:schemeClr val="tx1">
+                    <a:tint val="75000"/>
+                  </a:schemeClr>
+                </a:solidFill>
+              </a:defRPr>
+            </a:lvl8pPr>
+            <a:lvl9pPr marL="3657600" indent="0">
+              <a:buNone/>
+              <a:defRPr sz="1400">
+                <a:solidFill>
+                  <a:schemeClr val="tx1">
+                    <a:tint val="75000"/>
+                  </a:schemeClr>
+                </a:solidFill>
+              </a:defRPr>
+            </a:lvl9pPr>
+          </a:lstStyle>
+          <a:p>
+            <a:pPr lvl="0"/>
+            <a:r>
+              <a:rPr lang="zh-TW" altLang="en-US" smtClean="0"/>
+              <a:t>按一下以編輯母片文字樣式</a:t>
+            </a:r>
+          </a:p>
+        </p:txBody>
+      </p:sp>
+      <p:sp>
+        <p:nvSpPr>
+          <p:cNvPr id="4" name="日期版面配置區 3"/>
+          <p:cNvSpPr>
+            <a:spLocks noGrp="1"/>
+          </p:cNvSpPr>
+          <p:nvPr>
+            <p:ph type="dt" sz="half" idx="10"/>
+          </p:nvPr>
+        </p:nvSpPr>
+        <p:spPr/>
+        <p:txBody>
+          <a:bodyPr/>
+          <a:lstStyle>
+            <a:lvl1pPr>
+              <a:defRPr/>
+            </a:lvl1pPr>
+          </a:lstStyle>
+          <a:p>
+            <a:pPr>
+              <a:defRPr/>
+            </a:pPr>
+            <a:fld id="{C441A648-80D2-4283-B9D6-FF35F9E26215}" type="datetimeFigureOut">
+              <a:rPr lang="zh-TW" altLang="en-US"/>
+              <a:pPr>
+                <a:defRPr/>
+              </a:pPr>
+              <a:t>2017/3/13</a:t>
+            </a:fld>
+            <a:endParaRPr lang="zh-TW" altLang="en-US"/>
+          </a:p>
+        </p:txBody>
+      </p:sp>
+      <p:sp>
+        <p:nvSpPr>
+          <p:cNvPr id="5" name="頁尾版面配置區 4"/>
+          <p:cNvSpPr>
+            <a:spLocks noGrp="1"/>
+          </p:cNvSpPr>
+          <p:nvPr>
+            <p:ph type="ftr" sz="quarter" idx="11"/>
+          </p:nvPr>
+        </p:nvSpPr>
+        <p:spPr/>
+        <p:txBody>
+          <a:bodyPr/>
+          <a:lstStyle>
+            <a:lvl1pPr>
+              <a:defRPr/>
+            </a:lvl1pPr>
+          </a:lstStyle>
+          <a:p>
+            <a:pPr>
+              <a:defRPr/>
+            </a:pPr>
+            <a:endParaRPr lang="zh-TW" altLang="en-US"/>
+          </a:p>
+        </p:txBody>
+      </p:sp>
+      <p:sp>
+        <p:nvSpPr>
+          <p:cNvPr id="6" name="投影片編號版面配置區 5"/>
+          <p:cNvSpPr>
+            <a:spLocks noGrp="1"/>
+          </p:cNvSpPr>
+          <p:nvPr>
+            <p:ph type="sldNum" sz="quarter" idx="12"/>
+          </p:nvPr>
+        </p:nvSpPr>
+        <p:spPr/>
+        <p:txBody>
+          <a:bodyPr/>
+          <a:lstStyle>
+            <a:lvl1pPr>
+              <a:defRPr/>
+            </a:lvl1pPr>
+          </a:lstStyle>
+          <a:p>
+            <a:pPr>
+              <a:defRPr/>
+            </a:pPr>
+            <a:fld id="{0872A608-A03D-4DCD-9229-63709A9D6C54}" type="slidenum">
+              <a:rPr lang="zh-TW" altLang="en-US"/>
+              <a:pPr>
+                <a:defRPr/>
+              </a:pPr>
+              <a:t>‹#›</a:t>
+            </a:fld>
+            <a:endParaRPr lang="zh-TW" altLang="en-US"/>
+          </a:p>
+        </p:txBody>
+      </p:sp>
+    </p:spTree>
+  </p:cSld>
+  <p:clrMapOvr>
+    <a:masterClrMapping/>
+  </p:clrMapOvr>
+</p:sldLayout>
+</file>
+
+<file path=ppt/slideLayouts/slideLayout30.xml><?xml version="1.0" encoding="utf-8"?>
 <p:sldLayout xmlns:a="http://schemas.openxmlformats.org/drawingml/2006/main" xmlns:r="http://schemas.openxmlformats.org/officeDocument/2006/relationships" xmlns:p="http://schemas.openxmlformats.org/presentationml/2006/main" type="twoTxTwoObj" preserve="1">
   <p:cSld name="比對">
     <p:spTree>
@@ -6831,275 +7277,7 @@
 </p:sldLayout>
 </file>
 
-<file path=ppt/slideLayouts/slideLayout3.xml><?xml version="1.0" encoding="utf-8"?>
-<p:sldLayout xmlns:a="http://schemas.openxmlformats.org/drawingml/2006/main" xmlns:r="http://schemas.openxmlformats.org/officeDocument/2006/relationships" xmlns:p="http://schemas.openxmlformats.org/presentationml/2006/main" type="secHead" preserve="1">
-  <p:cSld name="區段標題">
-    <p:spTree>
-      <p:nvGrpSpPr>
-        <p:cNvPr id="1" name=""/>
-        <p:cNvGrpSpPr/>
-        <p:nvPr/>
-      </p:nvGrpSpPr>
-      <p:grpSpPr>
-        <a:xfrm>
-          <a:off x="0" y="0"/>
-          <a:ext cx="0" cy="0"/>
-          <a:chOff x="0" y="0"/>
-          <a:chExt cx="0" cy="0"/>
-        </a:xfrm>
-      </p:grpSpPr>
-      <p:sp>
-        <p:nvSpPr>
-          <p:cNvPr id="2" name="標題 1"/>
-          <p:cNvSpPr>
-            <a:spLocks noGrp="1"/>
-          </p:cNvSpPr>
-          <p:nvPr>
-            <p:ph type="title"/>
-          </p:nvPr>
-        </p:nvSpPr>
-        <p:spPr>
-          <a:xfrm>
-            <a:off x="722313" y="4406900"/>
-            <a:ext cx="7772400" cy="1362075"/>
-          </a:xfrm>
-        </p:spPr>
-        <p:txBody>
-          <a:bodyPr anchor="t"/>
-          <a:lstStyle>
-            <a:lvl1pPr algn="l">
-              <a:defRPr sz="4000" b="1" cap="all"/>
-            </a:lvl1pPr>
-          </a:lstStyle>
-          <a:p>
-            <a:r>
-              <a:rPr lang="zh-TW" altLang="en-US" smtClean="0"/>
-              <a:t>按一下以編輯母片標題樣式</a:t>
-            </a:r>
-            <a:endParaRPr lang="zh-TW" altLang="en-US"/>
-          </a:p>
-        </p:txBody>
-      </p:sp>
-      <p:sp>
-        <p:nvSpPr>
-          <p:cNvPr id="3" name="文字版面配置區 2"/>
-          <p:cNvSpPr>
-            <a:spLocks noGrp="1"/>
-          </p:cNvSpPr>
-          <p:nvPr>
-            <p:ph type="body" idx="1"/>
-          </p:nvPr>
-        </p:nvSpPr>
-        <p:spPr>
-          <a:xfrm>
-            <a:off x="722313" y="2906713"/>
-            <a:ext cx="7772400" cy="1500187"/>
-          </a:xfrm>
-        </p:spPr>
-        <p:txBody>
-          <a:bodyPr anchor="b"/>
-          <a:lstStyle>
-            <a:lvl1pPr marL="0" indent="0">
-              <a:buNone/>
-              <a:defRPr sz="2000">
-                <a:solidFill>
-                  <a:schemeClr val="tx1">
-                    <a:tint val="75000"/>
-                  </a:schemeClr>
-                </a:solidFill>
-              </a:defRPr>
-            </a:lvl1pPr>
-            <a:lvl2pPr marL="457200" indent="0">
-              <a:buNone/>
-              <a:defRPr sz="1800">
-                <a:solidFill>
-                  <a:schemeClr val="tx1">
-                    <a:tint val="75000"/>
-                  </a:schemeClr>
-                </a:solidFill>
-              </a:defRPr>
-            </a:lvl2pPr>
-            <a:lvl3pPr marL="914400" indent="0">
-              <a:buNone/>
-              <a:defRPr sz="1600">
-                <a:solidFill>
-                  <a:schemeClr val="tx1">
-                    <a:tint val="75000"/>
-                  </a:schemeClr>
-                </a:solidFill>
-              </a:defRPr>
-            </a:lvl3pPr>
-            <a:lvl4pPr marL="1371600" indent="0">
-              <a:buNone/>
-              <a:defRPr sz="1400">
-                <a:solidFill>
-                  <a:schemeClr val="tx1">
-                    <a:tint val="75000"/>
-                  </a:schemeClr>
-                </a:solidFill>
-              </a:defRPr>
-            </a:lvl4pPr>
-            <a:lvl5pPr marL="1828800" indent="0">
-              <a:buNone/>
-              <a:defRPr sz="1400">
-                <a:solidFill>
-                  <a:schemeClr val="tx1">
-                    <a:tint val="75000"/>
-                  </a:schemeClr>
-                </a:solidFill>
-              </a:defRPr>
-            </a:lvl5pPr>
-            <a:lvl6pPr marL="2286000" indent="0">
-              <a:buNone/>
-              <a:defRPr sz="1400">
-                <a:solidFill>
-                  <a:schemeClr val="tx1">
-                    <a:tint val="75000"/>
-                  </a:schemeClr>
-                </a:solidFill>
-              </a:defRPr>
-            </a:lvl6pPr>
-            <a:lvl7pPr marL="2743200" indent="0">
-              <a:buNone/>
-              <a:defRPr sz="1400">
-                <a:solidFill>
-                  <a:schemeClr val="tx1">
-                    <a:tint val="75000"/>
-                  </a:schemeClr>
-                </a:solidFill>
-              </a:defRPr>
-            </a:lvl7pPr>
-            <a:lvl8pPr marL="3200400" indent="0">
-              <a:buNone/>
-              <a:defRPr sz="1400">
-                <a:solidFill>
-                  <a:schemeClr val="tx1">
-                    <a:tint val="75000"/>
-                  </a:schemeClr>
-                </a:solidFill>
-              </a:defRPr>
-            </a:lvl8pPr>
-            <a:lvl9pPr marL="3657600" indent="0">
-              <a:buNone/>
-              <a:defRPr sz="1400">
-                <a:solidFill>
-                  <a:schemeClr val="tx1">
-                    <a:tint val="75000"/>
-                  </a:schemeClr>
-                </a:solidFill>
-              </a:defRPr>
-            </a:lvl9pPr>
-          </a:lstStyle>
-          <a:p>
-            <a:pPr lvl="0"/>
-            <a:r>
-              <a:rPr lang="zh-TW" altLang="en-US" smtClean="0"/>
-              <a:t>按一下以編輯母片文字樣式</a:t>
-            </a:r>
-          </a:p>
-        </p:txBody>
-      </p:sp>
-      <p:sp>
-        <p:nvSpPr>
-          <p:cNvPr id="4" name="日期版面配置區 3"/>
-          <p:cNvSpPr>
-            <a:spLocks noGrp="1"/>
-          </p:cNvSpPr>
-          <p:nvPr>
-            <p:ph type="dt" sz="half" idx="10"/>
-          </p:nvPr>
-        </p:nvSpPr>
-        <p:spPr/>
-        <p:txBody>
-          <a:bodyPr/>
-          <a:lstStyle>
-            <a:lvl1pPr>
-              <a:defRPr/>
-            </a:lvl1pPr>
-          </a:lstStyle>
-          <a:p>
-            <a:pPr>
-              <a:defRPr/>
-            </a:pPr>
-            <a:fld id="{C441A648-80D2-4283-B9D6-FF35F9E26215}" type="datetimeFigureOut">
-              <a:rPr lang="zh-TW" altLang="en-US"/>
-              <a:pPr>
-                <a:defRPr/>
-              </a:pPr>
-              <a:t>2017/3/13</a:t>
-            </a:fld>
-            <a:endParaRPr lang="zh-TW" altLang="en-US"/>
-          </a:p>
-        </p:txBody>
-      </p:sp>
-      <p:sp>
-        <p:nvSpPr>
-          <p:cNvPr id="5" name="頁尾版面配置區 4"/>
-          <p:cNvSpPr>
-            <a:spLocks noGrp="1"/>
-          </p:cNvSpPr>
-          <p:nvPr>
-            <p:ph type="ftr" sz="quarter" idx="11"/>
-          </p:nvPr>
-        </p:nvSpPr>
-        <p:spPr/>
-        <p:txBody>
-          <a:bodyPr/>
-          <a:lstStyle>
-            <a:lvl1pPr>
-              <a:defRPr/>
-            </a:lvl1pPr>
-          </a:lstStyle>
-          <a:p>
-            <a:pPr>
-              <a:defRPr/>
-            </a:pPr>
-            <a:endParaRPr lang="zh-TW" altLang="en-US"/>
-          </a:p>
-        </p:txBody>
-      </p:sp>
-      <p:sp>
-        <p:nvSpPr>
-          <p:cNvPr id="6" name="投影片編號版面配置區 5"/>
-          <p:cNvSpPr>
-            <a:spLocks noGrp="1"/>
-          </p:cNvSpPr>
-          <p:nvPr>
-            <p:ph type="sldNum" sz="quarter" idx="12"/>
-          </p:nvPr>
-        </p:nvSpPr>
-        <p:spPr/>
-        <p:txBody>
-          <a:bodyPr/>
-          <a:lstStyle>
-            <a:lvl1pPr>
-              <a:defRPr/>
-            </a:lvl1pPr>
-          </a:lstStyle>
-          <a:p>
-            <a:pPr>
-              <a:defRPr/>
-            </a:pPr>
-            <a:fld id="{0872A608-A03D-4DCD-9229-63709A9D6C54}" type="slidenum">
-              <a:rPr lang="zh-TW" altLang="en-US"/>
-              <a:pPr>
-                <a:defRPr/>
-              </a:pPr>
-              <a:t>‹#›</a:t>
-            </a:fld>
-            <a:endParaRPr lang="zh-TW" altLang="en-US"/>
-          </a:p>
-        </p:txBody>
-      </p:sp>
-    </p:spTree>
-  </p:cSld>
-  <p:clrMapOvr>
-    <a:masterClrMapping/>
-  </p:clrMapOvr>
-</p:sldLayout>
-</file>
-
-<file path=ppt/slideLayouts/slideLayout30.xml><?xml version="1.0" encoding="utf-8"?>
+<file path=ppt/slideLayouts/slideLayout31.xml><?xml version="1.0" encoding="utf-8"?>
 <p:sldLayout xmlns:a="http://schemas.openxmlformats.org/drawingml/2006/main" xmlns:r="http://schemas.openxmlformats.org/officeDocument/2006/relationships" xmlns:p="http://schemas.openxmlformats.org/presentationml/2006/main" type="titleOnly" preserve="1">
   <p:cSld name="只有標題">
     <p:spTree>
@@ -7239,7 +7417,7 @@
 </p:sldLayout>
 </file>
 
-<file path=ppt/slideLayouts/slideLayout31.xml><?xml version="1.0" encoding="utf-8"?>
+<file path=ppt/slideLayouts/slideLayout32.xml><?xml version="1.0" encoding="utf-8"?>
 <p:sldLayout xmlns:a="http://schemas.openxmlformats.org/drawingml/2006/main" xmlns:r="http://schemas.openxmlformats.org/officeDocument/2006/relationships" xmlns:p="http://schemas.openxmlformats.org/presentationml/2006/main" type="blank" preserve="1">
   <p:cSld name="空白">
     <p:spTree>
@@ -7356,7 +7534,7 @@
 </p:sldLayout>
 </file>
 
-<file path=ppt/slideLayouts/slideLayout32.xml><?xml version="1.0" encoding="utf-8"?>
+<file path=ppt/slideLayouts/slideLayout33.xml><?xml version="1.0" encoding="utf-8"?>
 <p:sldLayout xmlns:a="http://schemas.openxmlformats.org/drawingml/2006/main" xmlns:r="http://schemas.openxmlformats.org/officeDocument/2006/relationships" xmlns:p="http://schemas.openxmlformats.org/presentationml/2006/main" type="objTx" preserve="1">
   <p:cSld name="含標題的內容">
     <p:spTree>
@@ -7655,7 +7833,7 @@
 </p:sldLayout>
 </file>
 
-<file path=ppt/slideLayouts/slideLayout33.xml><?xml version="1.0" encoding="utf-8"?>
+<file path=ppt/slideLayouts/slideLayout34.xml><?xml version="1.0" encoding="utf-8"?>
 <p:sldLayout xmlns:a="http://schemas.openxmlformats.org/drawingml/2006/main" xmlns:r="http://schemas.openxmlformats.org/officeDocument/2006/relationships" xmlns:p="http://schemas.openxmlformats.org/presentationml/2006/main" type="picTx" preserve="1">
   <p:cSld name="含標題的圖片">
     <p:spTree>
@@ -7933,7 +8111,7 @@
 </p:sldLayout>
 </file>
 
-<file path=ppt/slideLayouts/slideLayout34.xml><?xml version="1.0" encoding="utf-8"?>
+<file path=ppt/slideLayouts/slideLayout35.xml><?xml version="1.0" encoding="utf-8"?>
 <p:sldLayout xmlns:a="http://schemas.openxmlformats.org/drawingml/2006/main" xmlns:r="http://schemas.openxmlformats.org/officeDocument/2006/relationships" xmlns:p="http://schemas.openxmlformats.org/presentationml/2006/main" type="vertTx" preserve="1">
   <p:cSld name="標題及直排文字">
     <p:spTree>
@@ -8125,7 +8303,7 @@
 </p:sldLayout>
 </file>
 
-<file path=ppt/slideLayouts/slideLayout35.xml><?xml version="1.0" encoding="utf-8"?>
+<file path=ppt/slideLayouts/slideLayout36.xml><?xml version="1.0" encoding="utf-8"?>
 <p:sldLayout xmlns:a="http://schemas.openxmlformats.org/drawingml/2006/main" xmlns:r="http://schemas.openxmlformats.org/officeDocument/2006/relationships" xmlns:p="http://schemas.openxmlformats.org/presentationml/2006/main" type="vertTitleAndTx" preserve="1">
   <p:cSld name="直排標題及文字">
     <p:spTree>
@@ -10704,6 +10882,7 @@
     <p:sldLayoutId id="2147485043" r:id="rId10"/>
     <p:sldLayoutId id="2147485044" r:id="rId11"/>
     <p:sldLayoutId id="2147485045" r:id="rId12"/>
+    <p:sldLayoutId id="2147485117" r:id="rId13"/>
   </p:sldLayoutIdLst>
   <p:txStyles>
     <p:titleStyle>
@@ -13475,12 +13654,8 @@
           <a:lstStyle/>
           <a:p>
             <a:r>
-              <a:rPr lang="en-US" altLang="zh-TW" dirty="0" smtClean="0"/>
-              <a:t>Oliver </a:t>
-            </a:r>
-            <a:r>
-              <a:rPr lang="en-US" altLang="zh-TW" dirty="0"/>
-              <a:t>Hu</a:t>
+              <a:rPr lang="en-US" altLang="zh-TW"/>
+              <a:t>Created By Oliver Hu</a:t>
             </a:r>
           </a:p>
         </p:txBody>
@@ -13556,7 +13731,9 @@
         </p:nvSpPr>
         <p:spPr/>
         <p:txBody>
-          <a:bodyPr/>
+          <a:bodyPr>
+            <a:normAutofit lnSpcReduction="10000"/>
+          </a:bodyPr>
           <a:lstStyle/>
           <a:p>
             <a:pPr>
@@ -14131,7 +14308,9 @@
         </p:nvSpPr>
         <p:spPr/>
         <p:txBody>
-          <a:bodyPr/>
+          <a:bodyPr>
+            <a:normAutofit fontScale="85000" lnSpcReduction="20000"/>
+          </a:bodyPr>
           <a:lstStyle/>
           <a:p>
             <a:pPr fontAlgn="auto">
@@ -15768,67 +15947,67 @@
           <a:lstStyle/>
           <a:p>
             <a:r>
-              <a:rPr lang="en-US" dirty="0" smtClean="0"/>
+              <a:rPr lang="en-US" sz="2000" dirty="0" smtClean="0"/>
               <a:t>The </a:t>
             </a:r>
             <a:r>
-              <a:rPr lang="en-US" dirty="0" err="1" smtClean="0"/>
+              <a:rPr lang="en-US" sz="2000" dirty="0" err="1" smtClean="0"/>
               <a:t>git</a:t>
             </a:r>
             <a:r>
-              <a:rPr lang="en-US" dirty="0" smtClean="0"/>
+              <a:rPr lang="en-US" sz="2000" dirty="0" smtClean="0"/>
               <a:t> directory is where </a:t>
             </a:r>
             <a:r>
-              <a:rPr lang="en-US" dirty="0" err="1" smtClean="0"/>
+              <a:rPr lang="en-US" sz="2000" dirty="0" err="1" smtClean="0"/>
               <a:t>git</a:t>
             </a:r>
             <a:r>
-              <a:rPr lang="en-US" dirty="0" smtClean="0"/>
+              <a:rPr lang="en-US" sz="2000" dirty="0" smtClean="0"/>
               <a:t> stores its local repository (containing all the </a:t>
             </a:r>
             <a:r>
-              <a:rPr lang="en-US" dirty="0" err="1" smtClean="0"/>
+              <a:rPr lang="en-US" sz="2000" dirty="0" err="1" smtClean="0"/>
               <a:t>git</a:t>
             </a:r>
             <a:r>
-              <a:rPr lang="en-US" dirty="0" smtClean="0"/>
+              <a:rPr lang="en-US" sz="2000" dirty="0" smtClean="0"/>
               <a:t> objects in the repository).</a:t>
             </a:r>
           </a:p>
           <a:p>
             <a:r>
-              <a:rPr lang="en-US" dirty="0" smtClean="0"/>
+              <a:rPr lang="en-US" sz="2000" dirty="0" smtClean="0"/>
               <a:t>The </a:t>
             </a:r>
             <a:r>
-              <a:rPr lang="en-US" dirty="0" err="1" smtClean="0"/>
+              <a:rPr lang="en-US" sz="2000" dirty="0" err="1" smtClean="0"/>
               <a:t>git</a:t>
             </a:r>
             <a:r>
-              <a:rPr lang="en-US" dirty="0" smtClean="0"/>
+              <a:rPr lang="en-US" sz="2000" dirty="0" smtClean="0"/>
               <a:t> directory lives at the topmost directory of your codebase. </a:t>
             </a:r>
           </a:p>
           <a:p>
             <a:r>
-              <a:rPr lang="en-US" dirty="0" smtClean="0"/>
+              <a:rPr lang="en-US" sz="2000" dirty="0" smtClean="0"/>
               <a:t>The </a:t>
             </a:r>
             <a:r>
-              <a:rPr lang="en-US" dirty="0" err="1" smtClean="0"/>
+              <a:rPr lang="en-US" sz="2000" dirty="0" err="1" smtClean="0"/>
               <a:t>git</a:t>
             </a:r>
             <a:r>
-              <a:rPr lang="en-US" dirty="0" smtClean="0"/>
+              <a:rPr lang="en-US" sz="2000" dirty="0" smtClean="0"/>
               <a:t> directory is called .</a:t>
             </a:r>
             <a:r>
-              <a:rPr lang="en-US" dirty="0" err="1" smtClean="0"/>
+              <a:rPr lang="en-US" sz="2000" dirty="0" err="1" smtClean="0"/>
               <a:t>git</a:t>
             </a:r>
             <a:r>
-              <a:rPr lang="en-US" dirty="0" smtClean="0"/>
+              <a:rPr lang="en-US" sz="2000" dirty="0" smtClean="0"/>
               <a:t>. </a:t>
             </a:r>
           </a:p>
@@ -15848,7 +16027,7 @@
         </p:nvSpPr>
         <p:spPr>
           <a:xfrm>
-            <a:off x="785786" y="3571876"/>
+            <a:off x="899592" y="3068960"/>
             <a:ext cx="6858048" cy="2428892"/>
           </a:xfrm>
           <a:prstGeom prst="rect">
@@ -16046,7 +16225,9 @@
         </p:nvSpPr>
         <p:spPr/>
         <p:txBody>
-          <a:bodyPr/>
+          <a:bodyPr>
+            <a:normAutofit fontScale="85000" lnSpcReduction="10000"/>
+          </a:bodyPr>
           <a:lstStyle/>
           <a:p>
             <a:r>
@@ -16821,7 +17002,9 @@
         </p:nvSpPr>
         <p:spPr/>
         <p:txBody>
-          <a:bodyPr/>
+          <a:bodyPr>
+            <a:normAutofit/>
+          </a:bodyPr>
           <a:lstStyle/>
           <a:p>
             <a:r>
@@ -17174,7 +17357,9 @@
         </p:nvSpPr>
         <p:spPr/>
         <p:txBody>
-          <a:bodyPr/>
+          <a:bodyPr>
+            <a:normAutofit/>
+          </a:bodyPr>
           <a:lstStyle/>
           <a:p>
             <a:r>
@@ -17527,13 +17712,13 @@
         </p:nvSpPr>
         <p:spPr>
           <a:xfrm>
-            <a:off x="2643174" y="4071942"/>
+            <a:off x="2900322" y="5373216"/>
             <a:ext cx="5786478" cy="1071570"/>
           </a:xfrm>
           <a:prstGeom prst="wedgeRoundRectCallout">
             <a:avLst>
-              <a:gd name="adj1" fmla="val 7899"/>
-              <a:gd name="adj2" fmla="val -99822"/>
+              <a:gd name="adj1" fmla="val 3022"/>
+              <a:gd name="adj2" fmla="val -104036"/>
               <a:gd name="adj3" fmla="val 16667"/>
             </a:avLst>
           </a:prstGeom>
@@ -17702,7 +17887,9 @@
         </p:nvSpPr>
         <p:spPr/>
         <p:txBody>
-          <a:bodyPr/>
+          <a:bodyPr>
+            <a:normAutofit/>
+          </a:bodyPr>
           <a:lstStyle/>
           <a:p>
             <a:r>
@@ -18932,7 +19119,9 @@
         </p:nvSpPr>
         <p:spPr/>
         <p:txBody>
-          <a:bodyPr/>
+          <a:bodyPr>
+            <a:normAutofit/>
+          </a:bodyPr>
           <a:lstStyle/>
           <a:p>
             <a:r>
@@ -19882,7 +20071,9 @@
         </p:nvSpPr>
         <p:spPr/>
         <p:txBody>
-          <a:bodyPr/>
+          <a:bodyPr>
+            <a:normAutofit fontScale="92500" lnSpcReduction="20000"/>
+          </a:bodyPr>
           <a:lstStyle/>
           <a:p>
             <a:r>
@@ -20987,9 +21178,16 @@
             <p:ph sz="half" idx="1"/>
           </p:nvPr>
         </p:nvSpPr>
-        <p:spPr/>
-        <p:txBody>
-          <a:bodyPr/>
+        <p:spPr>
+          <a:xfrm>
+            <a:off x="457200" y="1639341"/>
+            <a:ext cx="4038600" cy="4525963"/>
+          </a:xfrm>
+        </p:spPr>
+        <p:txBody>
+          <a:bodyPr>
+            <a:normAutofit fontScale="85000" lnSpcReduction="10000"/>
+          </a:bodyPr>
           <a:lstStyle/>
           <a:p>
             <a:pPr>
@@ -21183,32 +21381,18 @@
               <a:t> </a:t>
             </a:r>
             <a:r>
-              <a:rPr lang="en-US" altLang="zh-TW" dirty="0" err="1" smtClean="0">
-                <a:latin typeface="Courier New" pitchFamily="49" charset="0"/>
-                <a:cs typeface="Courier New" pitchFamily="49" charset="0"/>
-              </a:rPr>
-              <a:t>comit</a:t>
-            </a:r>
-            <a:r>
               <a:rPr lang="en-US" altLang="zh-TW" dirty="0" smtClean="0">
                 <a:latin typeface="Courier New" pitchFamily="49" charset="0"/>
                 <a:cs typeface="Courier New" pitchFamily="49" charset="0"/>
               </a:rPr>
-              <a:t> –m ”</a:t>
-            </a:r>
-            <a:r>
-              <a:rPr lang="en-US" altLang="zh-TW" dirty="0" err="1" smtClean="0">
-                <a:latin typeface="Courier New" pitchFamily="49" charset="0"/>
-                <a:cs typeface="Courier New" pitchFamily="49" charset="0"/>
-              </a:rPr>
-              <a:t>foo</a:t>
+              <a:t>commit </a:t>
             </a:r>
             <a:r>
               <a:rPr lang="en-US" altLang="zh-TW" dirty="0" smtClean="0">
                 <a:latin typeface="Courier New" pitchFamily="49" charset="0"/>
                 <a:cs typeface="Courier New" pitchFamily="49" charset="0"/>
               </a:rPr>
-              <a:t>”</a:t>
+              <a:t>–m ”foo”</a:t>
             </a:r>
             <a:endParaRPr lang="zh-TW" altLang="en-US" dirty="0">
               <a:latin typeface="Courier New" pitchFamily="49" charset="0"/>
@@ -21782,7 +21966,9 @@
         </p:nvSpPr>
         <p:spPr/>
         <p:txBody>
-          <a:bodyPr/>
+          <a:bodyPr>
+            <a:normAutofit fontScale="77500" lnSpcReduction="20000"/>
+          </a:bodyPr>
           <a:lstStyle/>
           <a:p>
             <a:r>
@@ -22134,7 +22320,9 @@
         </p:nvSpPr>
         <p:spPr/>
         <p:txBody>
-          <a:bodyPr/>
+          <a:bodyPr>
+            <a:normAutofit fontScale="92500" lnSpcReduction="10000"/>
+          </a:bodyPr>
           <a:lstStyle/>
           <a:p>
             <a:r>
@@ -23476,7 +23664,9 @@
         </p:nvSpPr>
         <p:spPr/>
         <p:txBody>
-          <a:bodyPr/>
+          <a:bodyPr>
+            <a:normAutofit lnSpcReduction="10000"/>
+          </a:bodyPr>
           <a:lstStyle/>
           <a:p>
             <a:r>
@@ -23693,7 +23883,9 @@
         </p:nvSpPr>
         <p:spPr/>
         <p:txBody>
-          <a:bodyPr/>
+          <a:bodyPr>
+            <a:normAutofit fontScale="85000" lnSpcReduction="10000"/>
+          </a:bodyPr>
           <a:lstStyle/>
           <a:p>
             <a:r>
@@ -24133,7 +24325,9 @@
         </p:nvSpPr>
         <p:spPr/>
         <p:txBody>
-          <a:bodyPr/>
+          <a:bodyPr>
+            <a:normAutofit fontScale="92500" lnSpcReduction="20000"/>
+          </a:bodyPr>
           <a:lstStyle/>
           <a:p>
             <a:r>
@@ -24343,7 +24537,9 @@
         </p:nvSpPr>
         <p:spPr/>
         <p:txBody>
-          <a:bodyPr/>
+          <a:bodyPr>
+            <a:normAutofit fontScale="85000" lnSpcReduction="20000"/>
+          </a:bodyPr>
           <a:lstStyle/>
           <a:p>
             <a:r>
@@ -24582,7 +24778,9 @@
         </p:nvSpPr>
         <p:spPr/>
         <p:txBody>
-          <a:bodyPr/>
+          <a:bodyPr>
+            <a:normAutofit lnSpcReduction="10000"/>
+          </a:bodyPr>
           <a:lstStyle/>
           <a:p>
             <a:pPr>
@@ -24992,7 +25190,9 @@
         </p:nvSpPr>
         <p:spPr/>
         <p:txBody>
-          <a:bodyPr/>
+          <a:bodyPr>
+            <a:normAutofit/>
+          </a:bodyPr>
           <a:lstStyle/>
           <a:p>
             <a:pPr>
@@ -25296,7 +25496,9 @@
         </p:nvSpPr>
         <p:spPr/>
         <p:txBody>
-          <a:bodyPr/>
+          <a:bodyPr>
+            <a:normAutofit lnSpcReduction="10000"/>
+          </a:bodyPr>
           <a:lstStyle/>
           <a:p>
             <a:pPr>
@@ -25633,7 +25835,9 @@
         </p:nvSpPr>
         <p:spPr/>
         <p:txBody>
-          <a:bodyPr/>
+          <a:bodyPr>
+            <a:normAutofit lnSpcReduction="10000"/>
+          </a:bodyPr>
           <a:lstStyle/>
           <a:p>
             <a:pPr>
@@ -25943,7 +26147,9 @@
         </p:nvSpPr>
         <p:spPr/>
         <p:txBody>
-          <a:bodyPr/>
+          <a:bodyPr>
+            <a:normAutofit fontScale="77500" lnSpcReduction="20000"/>
+          </a:bodyPr>
           <a:lstStyle/>
           <a:p>
             <a:r>
@@ -26134,7 +26340,9 @@
         </p:nvSpPr>
         <p:spPr/>
         <p:txBody>
-          <a:bodyPr/>
+          <a:bodyPr>
+            <a:normAutofit lnSpcReduction="10000"/>
+          </a:bodyPr>
           <a:lstStyle/>
           <a:p>
             <a:r>
@@ -26320,7 +26528,9 @@
         </p:nvSpPr>
         <p:spPr/>
         <p:txBody>
-          <a:bodyPr/>
+          <a:bodyPr>
+            <a:normAutofit fontScale="77500" lnSpcReduction="20000"/>
+          </a:bodyPr>
           <a:lstStyle/>
           <a:p>
             <a:r>

</xml_diff>